<commit_message>
final version of task 9
</commit_message>
<xml_diff>
--- a/doc/task9/Softwarearchitecture.pptx
+++ b/doc/task9/Softwarearchitecture.pptx
@@ -246,7 +246,7 @@
           <a:p>
             <a:fld id="{4681F75E-962A-45C3-98CE-8645D5A252DE}" type="datetimeFigureOut">
               <a:rPr lang="de-CH" smtClean="0"/>
-              <a:t>01.12.2016</a:t>
+              <a:t>02.12.2016</a:t>
             </a:fld>
             <a:endParaRPr lang="de-CH"/>
           </a:p>
@@ -416,7 +416,7 @@
           <a:p>
             <a:fld id="{4681F75E-962A-45C3-98CE-8645D5A252DE}" type="datetimeFigureOut">
               <a:rPr lang="de-CH" smtClean="0"/>
-              <a:t>01.12.2016</a:t>
+              <a:t>02.12.2016</a:t>
             </a:fld>
             <a:endParaRPr lang="de-CH"/>
           </a:p>
@@ -596,7 +596,7 @@
           <a:p>
             <a:fld id="{4681F75E-962A-45C3-98CE-8645D5A252DE}" type="datetimeFigureOut">
               <a:rPr lang="de-CH" smtClean="0"/>
-              <a:t>01.12.2016</a:t>
+              <a:t>02.12.2016</a:t>
             </a:fld>
             <a:endParaRPr lang="de-CH"/>
           </a:p>
@@ -1795,7 +1795,7 @@
           <a:p>
             <a:fld id="{4681F75E-962A-45C3-98CE-8645D5A252DE}" type="datetimeFigureOut">
               <a:rPr lang="de-CH" smtClean="0"/>
-              <a:t>01.12.2016</a:t>
+              <a:t>02.12.2016</a:t>
             </a:fld>
             <a:endParaRPr lang="de-CH"/>
           </a:p>
@@ -2041,7 +2041,7 @@
           <a:p>
             <a:fld id="{4681F75E-962A-45C3-98CE-8645D5A252DE}" type="datetimeFigureOut">
               <a:rPr lang="de-CH" smtClean="0"/>
-              <a:t>01.12.2016</a:t>
+              <a:t>02.12.2016</a:t>
             </a:fld>
             <a:endParaRPr lang="de-CH"/>
           </a:p>
@@ -2273,7 +2273,7 @@
           <a:p>
             <a:fld id="{4681F75E-962A-45C3-98CE-8645D5A252DE}" type="datetimeFigureOut">
               <a:rPr lang="de-CH" smtClean="0"/>
-              <a:t>01.12.2016</a:t>
+              <a:t>02.12.2016</a:t>
             </a:fld>
             <a:endParaRPr lang="de-CH"/>
           </a:p>
@@ -2640,7 +2640,7 @@
           <a:p>
             <a:fld id="{4681F75E-962A-45C3-98CE-8645D5A252DE}" type="datetimeFigureOut">
               <a:rPr lang="de-CH" smtClean="0"/>
-              <a:t>01.12.2016</a:t>
+              <a:t>02.12.2016</a:t>
             </a:fld>
             <a:endParaRPr lang="de-CH"/>
           </a:p>
@@ -2758,7 +2758,7 @@
           <a:p>
             <a:fld id="{4681F75E-962A-45C3-98CE-8645D5A252DE}" type="datetimeFigureOut">
               <a:rPr lang="de-CH" smtClean="0"/>
-              <a:t>01.12.2016</a:t>
+              <a:t>02.12.2016</a:t>
             </a:fld>
             <a:endParaRPr lang="de-CH"/>
           </a:p>
@@ -2853,7 +2853,7 @@
           <a:p>
             <a:fld id="{4681F75E-962A-45C3-98CE-8645D5A252DE}" type="datetimeFigureOut">
               <a:rPr lang="de-CH" smtClean="0"/>
-              <a:t>01.12.2016</a:t>
+              <a:t>02.12.2016</a:t>
             </a:fld>
             <a:endParaRPr lang="de-CH"/>
           </a:p>
@@ -3130,7 +3130,7 @@
           <a:p>
             <a:fld id="{4681F75E-962A-45C3-98CE-8645D5A252DE}" type="datetimeFigureOut">
               <a:rPr lang="de-CH" smtClean="0"/>
-              <a:t>01.12.2016</a:t>
+              <a:t>02.12.2016</a:t>
             </a:fld>
             <a:endParaRPr lang="de-CH"/>
           </a:p>
@@ -3383,7 +3383,7 @@
           <a:p>
             <a:fld id="{4681F75E-962A-45C3-98CE-8645D5A252DE}" type="datetimeFigureOut">
               <a:rPr lang="de-CH" smtClean="0"/>
-              <a:t>01.12.2016</a:t>
+              <a:t>02.12.2016</a:t>
             </a:fld>
             <a:endParaRPr lang="de-CH"/>
           </a:p>
@@ -3596,7 +3596,7 @@
           <a:p>
             <a:fld id="{4681F75E-962A-45C3-98CE-8645D5A252DE}" type="datetimeFigureOut">
               <a:rPr lang="de-CH" smtClean="0"/>
-              <a:t>01.12.2016</a:t>
+              <a:t>02.12.2016</a:t>
             </a:fld>
             <a:endParaRPr lang="de-CH"/>
           </a:p>
@@ -4067,6 +4067,10 @@
           <a:bodyPr/>
           <a:lstStyle/>
           <a:p>
+            <a:r>
+              <a:rPr lang="de-CH" smtClean="0"/>
+              <a:t>Software Engineering</a:t>
+            </a:r>
             <a:endParaRPr lang="de-CH"/>
           </a:p>
         </p:txBody>

</xml_diff>